<commit_message>
MAJ Fiches Bron pour Intégration Invictus
</commit_message>
<xml_diff>
--- a/06_Plateforme_Bron/Fiche_Bron.pptx
+++ b/06_Plateforme_Bron/Fiche_Bron.pptx
@@ -261,7 +261,7 @@
           <a:p>
             <a:fld id="{4C97D309-ED7C-4986-B4AB-F0B7E2C0F0C3}" type="datetimeFigureOut">
               <a:rPr lang="fr-FR" smtClean="0"/>
-              <a:t>27/02/2020</a:t>
+              <a:t>06/03/2020</a:t>
             </a:fld>
             <a:endParaRPr lang="fr-FR"/>
           </a:p>
@@ -471,7 +471,7 @@
           <a:p>
             <a:fld id="{4C97D309-ED7C-4986-B4AB-F0B7E2C0F0C3}" type="datetimeFigureOut">
               <a:rPr lang="fr-FR" smtClean="0"/>
-              <a:t>27/02/2020</a:t>
+              <a:t>06/03/2020</a:t>
             </a:fld>
             <a:endParaRPr lang="fr-FR"/>
           </a:p>
@@ -681,7 +681,7 @@
           <a:p>
             <a:fld id="{4C97D309-ED7C-4986-B4AB-F0B7E2C0F0C3}" type="datetimeFigureOut">
               <a:rPr lang="fr-FR" smtClean="0"/>
-              <a:t>27/02/2020</a:t>
+              <a:t>06/03/2020</a:t>
             </a:fld>
             <a:endParaRPr lang="fr-FR"/>
           </a:p>
@@ -1308,7 +1308,7 @@
           <a:p>
             <a:fld id="{4C97D309-ED7C-4986-B4AB-F0B7E2C0F0C3}" type="datetimeFigureOut">
               <a:rPr lang="fr-FR" smtClean="0"/>
-              <a:t>27/02/2020</a:t>
+              <a:t>06/03/2020</a:t>
             </a:fld>
             <a:endParaRPr lang="fr-FR"/>
           </a:p>
@@ -1578,7 +1578,7 @@
           <a:p>
             <a:fld id="{4C97D309-ED7C-4986-B4AB-F0B7E2C0F0C3}" type="datetimeFigureOut">
               <a:rPr lang="fr-FR" smtClean="0"/>
-              <a:t>27/02/2020</a:t>
+              <a:t>06/03/2020</a:t>
             </a:fld>
             <a:endParaRPr lang="fr-FR"/>
           </a:p>
@@ -1984,7 +1984,7 @@
           <a:p>
             <a:fld id="{4C97D309-ED7C-4986-B4AB-F0B7E2C0F0C3}" type="datetimeFigureOut">
               <a:rPr lang="fr-FR" smtClean="0"/>
-              <a:t>27/02/2020</a:t>
+              <a:t>06/03/2020</a:t>
             </a:fld>
             <a:endParaRPr lang="fr-FR"/>
           </a:p>
@@ -2134,7 +2134,7 @@
           <a:p>
             <a:fld id="{4C97D309-ED7C-4986-B4AB-F0B7E2C0F0C3}" type="datetimeFigureOut">
               <a:rPr lang="fr-FR" smtClean="0"/>
-              <a:t>27/02/2020</a:t>
+              <a:t>06/03/2020</a:t>
             </a:fld>
             <a:endParaRPr lang="fr-FR"/>
           </a:p>
@@ -2253,7 +2253,7 @@
           <a:p>
             <a:fld id="{4C97D309-ED7C-4986-B4AB-F0B7E2C0F0C3}" type="datetimeFigureOut">
               <a:rPr lang="fr-FR" smtClean="0"/>
-              <a:t>27/02/2020</a:t>
+              <a:t>06/03/2020</a:t>
             </a:fld>
             <a:endParaRPr lang="fr-FR"/>
           </a:p>
@@ -2563,7 +2563,7 @@
           <a:p>
             <a:fld id="{4C97D309-ED7C-4986-B4AB-F0B7E2C0F0C3}" type="datetimeFigureOut">
               <a:rPr lang="fr-FR" smtClean="0"/>
-              <a:t>27/02/2020</a:t>
+              <a:t>06/03/2020</a:t>
             </a:fld>
             <a:endParaRPr lang="fr-FR"/>
           </a:p>
@@ -2853,7 +2853,7 @@
           <a:p>
             <a:fld id="{4C97D309-ED7C-4986-B4AB-F0B7E2C0F0C3}" type="datetimeFigureOut">
               <a:rPr lang="fr-FR" smtClean="0"/>
-              <a:t>27/02/2020</a:t>
+              <a:t>06/03/2020</a:t>
             </a:fld>
             <a:endParaRPr lang="fr-FR"/>
           </a:p>
@@ -4198,7 +4198,7 @@
         <p:spPr>
           <a:xfrm>
             <a:off x="347388" y="2171554"/>
-            <a:ext cx="5366206" cy="1754326"/>
+            <a:ext cx="5366206" cy="2862322"/>
           </a:xfrm>
           <a:prstGeom prst="rect">
             <a:avLst/>
@@ -4243,6 +4243,23 @@
             <a:r>
               <a:rPr lang="fr-FR" dirty="0"/>
               <a:t>Laisser des messages écrits à propos de votre travail ou des pièces si nécessaire</a:t>
+            </a:r>
+          </a:p>
+          <a:p>
+            <a:pPr marL="285738" indent="-285738">
+              <a:buFont typeface="Wingdings" panose="05000000000000000000" pitchFamily="2" charset="2"/>
+              <a:buChar char="§"/>
+            </a:pPr>
+            <a:endParaRPr lang="fr-FR" dirty="0"/>
+          </a:p>
+          <a:p>
+            <a:pPr marL="285738" indent="-285738">
+              <a:buFont typeface="Wingdings" panose="05000000000000000000" pitchFamily="2" charset="2"/>
+              <a:buChar char="§"/>
+            </a:pPr>
+            <a:r>
+              <a:rPr lang="fr-FR" dirty="0"/>
+              <a:t>Définir un Responsable pour le Journal d’Intégration en début de séance, pour qu’il le remplisse en fin de séance</a:t>
             </a:r>
           </a:p>
         </p:txBody>

</xml_diff>